<commit_message>
Broken Tool Links Fix
Fixed Broken Tool Links and various typo fixes
</commit_message>
<xml_diff>
--- a/Lecture Slides/VideoLectureSlides/4.4.pptx
+++ b/Lecture Slides/VideoLectureSlides/4.4.pptx
@@ -156,6 +156,58 @@
 
 <file path=ppt/changesInfos/changesInfo1.xml><?xml version="1.0" encoding="utf-8"?>
 <pc:chgInfo xmlns:a="http://schemas.openxmlformats.org/drawingml/2006/main" xmlns:r="http://schemas.openxmlformats.org/officeDocument/2006/relationships" xmlns:ac="http://schemas.microsoft.com/office/drawing/2013/main/command" xmlns:pc="http://schemas.microsoft.com/office/powerpoint/2013/main/command">
+  <pc:docChgLst>
+    <pc:chgData name="Moore, Jacob Preston" userId="fdd3fd0f-c483-48c9-988d-7deb216763fd" providerId="ADAL" clId="{B83CA893-13D7-4BC4-AF62-0806F1E57D75}"/>
+    <pc:docChg chg="custSel modSld">
+      <pc:chgData name="Moore, Jacob Preston" userId="fdd3fd0f-c483-48c9-988d-7deb216763fd" providerId="ADAL" clId="{B83CA893-13D7-4BC4-AF62-0806F1E57D75}" dt="2020-10-01T16:03:50.225" v="102" actId="20577"/>
+      <pc:docMkLst>
+        <pc:docMk/>
+      </pc:docMkLst>
+      <pc:sldChg chg="modAnim">
+        <pc:chgData name="Moore, Jacob Preston" userId="fdd3fd0f-c483-48c9-988d-7deb216763fd" providerId="ADAL" clId="{B83CA893-13D7-4BC4-AF62-0806F1E57D75}" dt="2020-09-22T15:20:34.741" v="1"/>
+        <pc:sldMkLst>
+          <pc:docMk/>
+          <pc:sldMk cId="402362879" sldId="314"/>
+        </pc:sldMkLst>
+      </pc:sldChg>
+      <pc:sldChg chg="modAnim">
+        <pc:chgData name="Moore, Jacob Preston" userId="fdd3fd0f-c483-48c9-988d-7deb216763fd" providerId="ADAL" clId="{B83CA893-13D7-4BC4-AF62-0806F1E57D75}" dt="2020-09-22T15:20:58.333" v="4"/>
+        <pc:sldMkLst>
+          <pc:docMk/>
+          <pc:sldMk cId="1214655133" sldId="315"/>
+        </pc:sldMkLst>
+      </pc:sldChg>
+      <pc:sldChg chg="modSp modAnim">
+        <pc:chgData name="Moore, Jacob Preston" userId="fdd3fd0f-c483-48c9-988d-7deb216763fd" providerId="ADAL" clId="{B83CA893-13D7-4BC4-AF62-0806F1E57D75}" dt="2020-10-01T16:03:50.225" v="102" actId="20577"/>
+        <pc:sldMkLst>
+          <pc:docMk/>
+          <pc:sldMk cId="3061164950" sldId="316"/>
+        </pc:sldMkLst>
+        <pc:spChg chg="mod">
+          <ac:chgData name="Moore, Jacob Preston" userId="fdd3fd0f-c483-48c9-988d-7deb216763fd" providerId="ADAL" clId="{B83CA893-13D7-4BC4-AF62-0806F1E57D75}" dt="2020-10-01T16:03:50.225" v="102" actId="20577"/>
+          <ac:spMkLst>
+            <pc:docMk/>
+            <pc:sldMk cId="3061164950" sldId="316"/>
+            <ac:spMk id="3" creationId="{00000000-0000-0000-0000-000000000000}"/>
+          </ac:spMkLst>
+        </pc:spChg>
+      </pc:sldChg>
+      <pc:sldChg chg="modAnim">
+        <pc:chgData name="Moore, Jacob Preston" userId="fdd3fd0f-c483-48c9-988d-7deb216763fd" providerId="ADAL" clId="{B83CA893-13D7-4BC4-AF62-0806F1E57D75}" dt="2020-09-22T15:23:31.112" v="99"/>
+        <pc:sldMkLst>
+          <pc:docMk/>
+          <pc:sldMk cId="2671741589" sldId="317"/>
+        </pc:sldMkLst>
+      </pc:sldChg>
+      <pc:sldChg chg="modAnim">
+        <pc:chgData name="Moore, Jacob Preston" userId="fdd3fd0f-c483-48c9-988d-7deb216763fd" providerId="ADAL" clId="{B83CA893-13D7-4BC4-AF62-0806F1E57D75}" dt="2020-09-22T15:25:14.194" v="101"/>
+        <pc:sldMkLst>
+          <pc:docMk/>
+          <pc:sldMk cId="1394727948" sldId="318"/>
+        </pc:sldMkLst>
+      </pc:sldChg>
+    </pc:docChg>
+  </pc:docChgLst>
   <pc:docChgLst>
     <pc:chgData name="Moore, Jacob Preston" userId="fdd3fd0f-c483-48c9-988d-7deb216763fd" providerId="ADAL" clId="{A59CBCED-7092-4544-9E0C-8C935690C011}"/>
     <pc:docChg chg="custSel addSld delSld modSld">
@@ -319,58 +371,6 @@
       </pc:sldChg>
     </pc:docChg>
   </pc:docChgLst>
-  <pc:docChgLst>
-    <pc:chgData name="Moore, Jacob Preston" userId="fdd3fd0f-c483-48c9-988d-7deb216763fd" providerId="ADAL" clId="{B83CA893-13D7-4BC4-AF62-0806F1E57D75}"/>
-    <pc:docChg chg="custSel modSld">
-      <pc:chgData name="Moore, Jacob Preston" userId="fdd3fd0f-c483-48c9-988d-7deb216763fd" providerId="ADAL" clId="{B83CA893-13D7-4BC4-AF62-0806F1E57D75}" dt="2020-10-01T16:03:50.225" v="102" actId="20577"/>
-      <pc:docMkLst>
-        <pc:docMk/>
-      </pc:docMkLst>
-      <pc:sldChg chg="modAnim">
-        <pc:chgData name="Moore, Jacob Preston" userId="fdd3fd0f-c483-48c9-988d-7deb216763fd" providerId="ADAL" clId="{B83CA893-13D7-4BC4-AF62-0806F1E57D75}" dt="2020-09-22T15:20:34.741" v="1"/>
-        <pc:sldMkLst>
-          <pc:docMk/>
-          <pc:sldMk cId="402362879" sldId="314"/>
-        </pc:sldMkLst>
-      </pc:sldChg>
-      <pc:sldChg chg="modAnim">
-        <pc:chgData name="Moore, Jacob Preston" userId="fdd3fd0f-c483-48c9-988d-7deb216763fd" providerId="ADAL" clId="{B83CA893-13D7-4BC4-AF62-0806F1E57D75}" dt="2020-09-22T15:20:58.333" v="4"/>
-        <pc:sldMkLst>
-          <pc:docMk/>
-          <pc:sldMk cId="1214655133" sldId="315"/>
-        </pc:sldMkLst>
-      </pc:sldChg>
-      <pc:sldChg chg="modSp modAnim">
-        <pc:chgData name="Moore, Jacob Preston" userId="fdd3fd0f-c483-48c9-988d-7deb216763fd" providerId="ADAL" clId="{B83CA893-13D7-4BC4-AF62-0806F1E57D75}" dt="2020-10-01T16:03:50.225" v="102" actId="20577"/>
-        <pc:sldMkLst>
-          <pc:docMk/>
-          <pc:sldMk cId="3061164950" sldId="316"/>
-        </pc:sldMkLst>
-        <pc:spChg chg="mod">
-          <ac:chgData name="Moore, Jacob Preston" userId="fdd3fd0f-c483-48c9-988d-7deb216763fd" providerId="ADAL" clId="{B83CA893-13D7-4BC4-AF62-0806F1E57D75}" dt="2020-10-01T16:03:50.225" v="102" actId="20577"/>
-          <ac:spMkLst>
-            <pc:docMk/>
-            <pc:sldMk cId="3061164950" sldId="316"/>
-            <ac:spMk id="3" creationId="{00000000-0000-0000-0000-000000000000}"/>
-          </ac:spMkLst>
-        </pc:spChg>
-      </pc:sldChg>
-      <pc:sldChg chg="modAnim">
-        <pc:chgData name="Moore, Jacob Preston" userId="fdd3fd0f-c483-48c9-988d-7deb216763fd" providerId="ADAL" clId="{B83CA893-13D7-4BC4-AF62-0806F1E57D75}" dt="2020-09-22T15:23:31.112" v="99"/>
-        <pc:sldMkLst>
-          <pc:docMk/>
-          <pc:sldMk cId="2671741589" sldId="317"/>
-        </pc:sldMkLst>
-      </pc:sldChg>
-      <pc:sldChg chg="modAnim">
-        <pc:chgData name="Moore, Jacob Preston" userId="fdd3fd0f-c483-48c9-988d-7deb216763fd" providerId="ADAL" clId="{B83CA893-13D7-4BC4-AF62-0806F1E57D75}" dt="2020-09-22T15:25:14.194" v="101"/>
-        <pc:sldMkLst>
-          <pc:docMk/>
-          <pc:sldMk cId="1394727948" sldId="318"/>
-        </pc:sldMkLst>
-      </pc:sldChg>
-    </pc:docChg>
-  </pc:docChgLst>
 </pc:chgInfo>
 </file>
 
@@ -456,7 +456,7 @@
           <a:p>
             <a:fld id="{1AA1AB63-216F-4D5B-8811-CCB935E98D4A}" type="datetimeFigureOut">
               <a:rPr lang="en-US" smtClean="0"/>
-              <a:t>10/1/2020</a:t>
+              <a:t>10/20/2024</a:t>
             </a:fld>
             <a:endParaRPr lang="en-US"/>
           </a:p>
@@ -5734,7 +5734,7 @@
           <a:p>
             <a:r>
               <a:rPr lang="en-US" dirty="0"/>
-              <a:t>A gravitational body force can be through of as the </a:t>
+              <a:t>A gravitational body force can be thought of as the </a:t>
             </a:r>
             <a:r>
               <a:rPr lang="en-US" b="1" dirty="0"/>
@@ -7304,6 +7304,21 @@
 </file>
 
 <file path=customXml/item1.xml><?xml version="1.0" encoding="utf-8"?>
+<p:properties xmlns:p="http://schemas.microsoft.com/office/2006/metadata/properties" xmlns:xsi="http://www.w3.org/2001/XMLSchema-instance" xmlns:pc="http://schemas.microsoft.com/office/infopath/2007/PartnerControls">
+  <documentManagement/>
+</p:properties>
+</file>
+
+<file path=customXml/item2.xml><?xml version="1.0" encoding="utf-8"?>
+<?mso-contentType ?>
+<FormTemplates xmlns="http://schemas.microsoft.com/sharepoint/v3/contenttype/forms">
+  <Display>DocumentLibraryForm</Display>
+  <Edit>DocumentLibraryForm</Edit>
+  <New>DocumentLibraryForm</New>
+</FormTemplates>
+</file>
+
+<file path=customXml/item3.xml><?xml version="1.0" encoding="utf-8"?>
 <ct:contentTypeSchema xmlns:ct="http://schemas.microsoft.com/office/2006/metadata/contentType" xmlns:ma="http://schemas.microsoft.com/office/2006/metadata/properties/metaAttributes" ct:_="" ma:_="" ma:contentTypeName="Document" ma:contentTypeID="0x010100A06DF21F5BB2734A800ED30F3F452129" ma:contentTypeVersion="12" ma:contentTypeDescription="Create a new document." ma:contentTypeScope="" ma:versionID="544d96a5fbac5de9d5d902b535c73fb2">
   <xsd:schema xmlns:xsd="http://www.w3.org/2001/XMLSchema" xmlns:xs="http://www.w3.org/2001/XMLSchema" xmlns:p="http://schemas.microsoft.com/office/2006/metadata/properties" xmlns:ns3="90d05cb5-950f-4f68-bc2c-e17794455b92" xmlns:ns4="b4eab9fa-dbb0-4082-8491-8bd54207a265" targetNamespace="http://schemas.microsoft.com/office/2006/metadata/properties" ma:root="true" ma:fieldsID="7a710efc71c2169bf9c05e5a40dddf12" ns3:_="" ns4:_="">
     <xsd:import namespace="90d05cb5-950f-4f68-bc2c-e17794455b92"/>
@@ -7520,22 +7535,24 @@
 </ct:contentTypeSchema>
 </file>
 
-<file path=customXml/item2.xml><?xml version="1.0" encoding="utf-8"?>
-<?mso-contentType ?>
-<FormTemplates xmlns="http://schemas.microsoft.com/sharepoint/v3/contenttype/forms">
-  <Display>DocumentLibraryForm</Display>
-  <Edit>DocumentLibraryForm</Edit>
-  <New>DocumentLibraryForm</New>
-</FormTemplates>
+<file path=customXml/itemProps1.xml><?xml version="1.0" encoding="utf-8"?>
+<ds:datastoreItem xmlns:ds="http://schemas.openxmlformats.org/officeDocument/2006/customXml" ds:itemID="{52EB1464-66D1-425A-BBB5-7A9312BBE9C4}">
+  <ds:schemaRefs>
+    <ds:schemaRef ds:uri="http://schemas.microsoft.com/office/2006/metadata/properties"/>
+    <ds:schemaRef ds:uri="http://schemas.microsoft.com/office/infopath/2007/PartnerControls"/>
+  </ds:schemaRefs>
+</ds:datastoreItem>
 </file>
 
-<file path=customXml/item3.xml><?xml version="1.0" encoding="utf-8"?>
-<p:properties xmlns:p="http://schemas.microsoft.com/office/2006/metadata/properties" xmlns:xsi="http://www.w3.org/2001/XMLSchema-instance" xmlns:pc="http://schemas.microsoft.com/office/infopath/2007/PartnerControls">
-  <documentManagement/>
-</p:properties>
+<file path=customXml/itemProps2.xml><?xml version="1.0" encoding="utf-8"?>
+<ds:datastoreItem xmlns:ds="http://schemas.openxmlformats.org/officeDocument/2006/customXml" ds:itemID="{F5CF5F32-56DC-4068-8B04-457CF34A96F3}">
+  <ds:schemaRefs>
+    <ds:schemaRef ds:uri="http://schemas.microsoft.com/sharepoint/v3/contenttype/forms"/>
+  </ds:schemaRefs>
+</ds:datastoreItem>
 </file>
 
-<file path=customXml/itemProps1.xml><?xml version="1.0" encoding="utf-8"?>
+<file path=customXml/itemProps3.xml><?xml version="1.0" encoding="utf-8"?>
 <ds:datastoreItem xmlns:ds="http://schemas.openxmlformats.org/officeDocument/2006/customXml" ds:itemID="{A43B8A4B-79FE-4529-931C-D64224FA70E3}">
   <ds:schemaRefs>
     <ds:schemaRef ds:uri="http://schemas.microsoft.com/office/2006/metadata/contentType"/>
@@ -7552,21 +7569,4 @@
     <ds:schemaRef ds:uri="http://schemas.microsoft.com/internal/obd"/>
   </ds:schemaRefs>
 </ds:datastoreItem>
-</file>
-
-<file path=customXml/itemProps2.xml><?xml version="1.0" encoding="utf-8"?>
-<ds:datastoreItem xmlns:ds="http://schemas.openxmlformats.org/officeDocument/2006/customXml" ds:itemID="{F5CF5F32-56DC-4068-8B04-457CF34A96F3}">
-  <ds:schemaRefs>
-    <ds:schemaRef ds:uri="http://schemas.microsoft.com/sharepoint/v3/contenttype/forms"/>
-  </ds:schemaRefs>
-</ds:datastoreItem>
-</file>
-
-<file path=customXml/itemProps3.xml><?xml version="1.0" encoding="utf-8"?>
-<ds:datastoreItem xmlns:ds="http://schemas.openxmlformats.org/officeDocument/2006/customXml" ds:itemID="{52EB1464-66D1-425A-BBB5-7A9312BBE9C4}">
-  <ds:schemaRefs>
-    <ds:schemaRef ds:uri="http://schemas.microsoft.com/office/2006/metadata/properties"/>
-    <ds:schemaRef ds:uri="http://schemas.microsoft.com/office/infopath/2007/PartnerControls"/>
-  </ds:schemaRefs>
-</ds:datastoreItem>
 </file>
</xml_diff>